<commit_message>
chore: Project updates after review
</commit_message>
<xml_diff>
--- a/starter/DevOpsPipeline.pptx
+++ b/starter/DevOpsPipeline.pptx
@@ -3575,10 +3575,10 @@
         </p:nvGrpSpPr>
         <p:grpSpPr>
           <a:xfrm>
-            <a:off x="2619162" y="2824602"/>
-            <a:ext cx="1308002" cy="597796"/>
-            <a:chOff x="0" y="0"/>
-            <a:chExt cx="1308000" cy="597795"/>
+            <a:off x="2591481" y="2953878"/>
+            <a:ext cx="1308001" cy="597601"/>
+            <a:chOff x="0" y="139797"/>
+            <a:chExt cx="1308000" cy="597600"/>
           </a:xfrm>
         </p:grpSpPr>
         <p:sp>
@@ -3589,7 +3589,7 @@
           </p:nvSpPr>
           <p:spPr>
             <a:xfrm>
-              <a:off x="0" y="97"/>
+              <a:off x="0" y="139797"/>
               <a:ext cx="1308001" cy="597601"/>
             </a:xfrm>
             <a:prstGeom prst="rect">
@@ -3618,203 +3618,13 @@
         </p:sp>
         <p:sp>
           <p:nvSpPr>
-            <p:cNvPr id="129" name="a. Scan infrastructure as code templates."/>
-            <p:cNvSpPr txBox="1"/>
-            <p:nvPr/>
-          </p:nvSpPr>
-          <p:spPr>
-            <a:xfrm>
-              <a:off x="0" y="-1"/>
-              <a:ext cx="1308001" cy="597797"/>
-            </a:xfrm>
-            <a:prstGeom prst="rect">
-              <a:avLst/>
-            </a:prstGeom>
-            <a:solidFill>
-              <a:srgbClr val="FF9B53"/>
-            </a:solidFill>
-            <a:ln w="12700" cap="flat">
-              <a:noFill/>
-              <a:miter lim="400000"/>
-            </a:ln>
-            <a:effectLst/>
-            <a:extLst>
-              <a:ext uri="{C572A759-6A51-4108-AA02-DFA0A04FC94B}">
-                <ma14:wrappingTextBoxFlag xmlns:ma14="http://schemas.microsoft.com/office/mac/drawingml/2011/main" val="1"/>
-              </a:ext>
-            </a:extLst>
-          </p:spPr>
-          <p:txBody>
-            <a:bodyPr wrap="square" lIns="91424" tIns="91424" rIns="91424" bIns="91424" numCol="1" anchor="ctr">
-              <a:spAutoFit/>
-            </a:bodyPr>
-            <a:lstStyle>
-              <a:lvl1pPr>
-                <a:defRPr sz="1000"/>
-              </a:lvl1pPr>
-            </a:lstStyle>
-            <a:p>
-              <a:pPr/>
-              <a:r>
-                <a:t>a. Scan infrastructure as code templates. </a:t>
-              </a:r>
-            </a:p>
-          </p:txBody>
-        </p:sp>
-      </p:grpSp>
-      <p:grpSp>
-        <p:nvGrpSpPr>
-          <p:cNvPr id="133" name="Google Shape;54;p13"/>
-          <p:cNvGrpSpPr/>
-          <p:nvPr/>
-        </p:nvGrpSpPr>
-        <p:grpSpPr>
-          <a:xfrm>
-            <a:off x="4118230" y="2111327"/>
-            <a:ext cx="1308001" cy="597796"/>
-            <a:chOff x="0" y="0"/>
-            <a:chExt cx="1308000" cy="597795"/>
-          </a:xfrm>
-        </p:grpSpPr>
-        <p:sp>
-          <p:nvSpPr>
-            <p:cNvPr id="131" name="Rectangle"/>
+            <p:cNvPr id="129" name="a. Scan infrastructure as code templates.…"/>
             <p:cNvSpPr/>
             <p:nvPr/>
           </p:nvSpPr>
           <p:spPr>
             <a:xfrm>
-              <a:off x="0" y="97"/>
-              <a:ext cx="1308001" cy="597601"/>
-            </a:xfrm>
-            <a:prstGeom prst="rect">
-              <a:avLst/>
-            </a:prstGeom>
-            <a:solidFill>
-              <a:srgbClr val="CFE2F3"/>
-            </a:solidFill>
-            <a:ln w="12700" cap="flat">
-              <a:noFill/>
-              <a:miter lim="400000"/>
-            </a:ln>
-            <a:effectLst/>
-          </p:spPr>
-          <p:txBody>
-            <a:bodyPr wrap="square" lIns="0" tIns="0" rIns="0" bIns="0" numCol="1" anchor="ctr">
-              <a:noAutofit/>
-            </a:bodyPr>
-            <a:lstStyle/>
-            <a:p>
-              <a:pPr algn="ctr">
-                <a:defRPr sz="1000"/>
-              </a:pPr>
-            </a:p>
-          </p:txBody>
-        </p:sp>
-        <p:sp>
-          <p:nvSpPr>
-            <p:cNvPr id="132" name="b. Scan AMI’s or containers for OS vulnerabilities"/>
-            <p:cNvSpPr txBox="1"/>
-            <p:nvPr/>
-          </p:nvSpPr>
-          <p:spPr>
-            <a:xfrm>
-              <a:off x="0" y="-1"/>
-              <a:ext cx="1308001" cy="597797"/>
-            </a:xfrm>
-            <a:prstGeom prst="rect">
-              <a:avLst/>
-            </a:prstGeom>
-            <a:solidFill>
-              <a:srgbClr val="FF9B53"/>
-            </a:solidFill>
-            <a:ln w="12700" cap="flat">
-              <a:noFill/>
-              <a:miter lim="400000"/>
-            </a:ln>
-            <a:effectLst/>
-            <a:extLst>
-              <a:ext uri="{C572A759-6A51-4108-AA02-DFA0A04FC94B}">
-                <ma14:wrappingTextBoxFlag xmlns:ma14="http://schemas.microsoft.com/office/mac/drawingml/2011/main" val="1"/>
-              </a:ext>
-            </a:extLst>
-          </p:spPr>
-          <p:txBody>
-            <a:bodyPr wrap="square" lIns="91424" tIns="91424" rIns="91424" bIns="91424" numCol="1" anchor="ctr">
-              <a:spAutoFit/>
-            </a:bodyPr>
-            <a:lstStyle>
-              <a:lvl1pPr>
-                <a:defRPr sz="1000"/>
-              </a:lvl1pPr>
-            </a:lstStyle>
-            <a:p>
-              <a:pPr/>
-              <a:r>
-                <a:t>b. Scan AMI’s or containers for OS vulnerabilities</a:t>
-              </a:r>
-            </a:p>
-          </p:txBody>
-        </p:sp>
-      </p:grpSp>
-      <p:grpSp>
-        <p:nvGrpSpPr>
-          <p:cNvPr id="136" name="Google Shape;54;p13"/>
-          <p:cNvGrpSpPr/>
-          <p:nvPr/>
-        </p:nvGrpSpPr>
-        <p:grpSpPr>
-          <a:xfrm>
-            <a:off x="7639545" y="3728950"/>
-            <a:ext cx="1308001" cy="597601"/>
-            <a:chOff x="0" y="69947"/>
-            <a:chExt cx="1308000" cy="597600"/>
-          </a:xfrm>
-        </p:grpSpPr>
-        <p:sp>
-          <p:nvSpPr>
-            <p:cNvPr id="134" name="Rectangle"/>
-            <p:cNvSpPr/>
-            <p:nvPr/>
-          </p:nvSpPr>
-          <p:spPr>
-            <a:xfrm>
-              <a:off x="0" y="69947"/>
-              <a:ext cx="1308001" cy="597601"/>
-            </a:xfrm>
-            <a:prstGeom prst="rect">
-              <a:avLst/>
-            </a:prstGeom>
-            <a:solidFill>
-              <a:srgbClr val="CFE2F3"/>
-            </a:solidFill>
-            <a:ln w="12700" cap="flat">
-              <a:noFill/>
-              <a:miter lim="400000"/>
-            </a:ln>
-            <a:effectLst/>
-          </p:spPr>
-          <p:txBody>
-            <a:bodyPr wrap="square" lIns="0" tIns="0" rIns="0" bIns="0" numCol="1" anchor="ctr">
-              <a:noAutofit/>
-            </a:bodyPr>
-            <a:lstStyle/>
-            <a:p>
-              <a:pPr algn="ctr">
-                <a:defRPr sz="1000"/>
-              </a:pPr>
-            </a:p>
-          </p:txBody>
-        </p:sp>
-        <p:sp>
-          <p:nvSpPr>
-            <p:cNvPr id="135" name="c. Scan an AWS environment for cloud configuration vulnerabilities"/>
-            <p:cNvSpPr/>
-            <p:nvPr/>
-          </p:nvSpPr>
-          <p:spPr>
-            <a:xfrm>
-              <a:off x="0" y="368747"/>
+              <a:off x="0" y="438597"/>
               <a:ext cx="1308001" cy="1"/>
             </a:xfrm>
             <a:custGeom>
@@ -3872,15 +3682,314 @@
             <a:bodyPr wrap="square" lIns="91424" tIns="91424" rIns="91424" bIns="91424" numCol="1" anchor="ctr">
               <a:spAutoFit/>
             </a:bodyPr>
-            <a:lstStyle>
-              <a:lvl1pPr>
+            <a:lstStyle/>
+            <a:p>
+              <a:pPr>
                 <a:defRPr sz="1000"/>
-              </a:lvl1pPr>
-            </a:lstStyle>
+              </a:pPr>
+              <a:r>
+                <a:t>a. Scan infrastructure as code templates. </a:t>
+              </a:r>
+            </a:p>
             <a:p>
-              <a:pPr/>
+              <a:pPr>
+                <a:defRPr sz="1000"/>
+              </a:pPr>
+            </a:p>
+            <a:p>
+              <a:pPr>
+                <a:defRPr b="1" sz="1000"/>
+              </a:pPr>
+              <a:r>
+                <a:t>- Regula</a:t>
+              </a:r>
+            </a:p>
+          </p:txBody>
+        </p:sp>
+      </p:grpSp>
+      <p:grpSp>
+        <p:nvGrpSpPr>
+          <p:cNvPr id="133" name="Google Shape;54;p13"/>
+          <p:cNvGrpSpPr/>
+          <p:nvPr/>
+        </p:nvGrpSpPr>
+        <p:grpSpPr>
+          <a:xfrm>
+            <a:off x="4118230" y="2111424"/>
+            <a:ext cx="1308001" cy="597602"/>
+            <a:chOff x="0" y="139797"/>
+            <a:chExt cx="1308000" cy="597600"/>
+          </a:xfrm>
+        </p:grpSpPr>
+        <p:sp>
+          <p:nvSpPr>
+            <p:cNvPr id="131" name="Rectangle"/>
+            <p:cNvSpPr/>
+            <p:nvPr/>
+          </p:nvSpPr>
+          <p:spPr>
+            <a:xfrm>
+              <a:off x="0" y="139797"/>
+              <a:ext cx="1308001" cy="597601"/>
+            </a:xfrm>
+            <a:prstGeom prst="rect">
+              <a:avLst/>
+            </a:prstGeom>
+            <a:solidFill>
+              <a:srgbClr val="CFE2F3"/>
+            </a:solidFill>
+            <a:ln w="12700" cap="flat">
+              <a:noFill/>
+              <a:miter lim="400000"/>
+            </a:ln>
+            <a:effectLst/>
+          </p:spPr>
+          <p:txBody>
+            <a:bodyPr wrap="square" lIns="0" tIns="0" rIns="0" bIns="0" numCol="1" anchor="ctr">
+              <a:noAutofit/>
+            </a:bodyPr>
+            <a:lstStyle/>
+            <a:p>
+              <a:pPr algn="ctr">
+                <a:defRPr sz="1000"/>
+              </a:pPr>
+            </a:p>
+          </p:txBody>
+        </p:sp>
+        <p:sp>
+          <p:nvSpPr>
+            <p:cNvPr id="132" name="b. Scan AMI’s or containers for OS vulnerabilities…"/>
+            <p:cNvSpPr/>
+            <p:nvPr/>
+          </p:nvSpPr>
+          <p:spPr>
+            <a:xfrm>
+              <a:off x="0" y="438597"/>
+              <a:ext cx="1308001" cy="1"/>
+            </a:xfrm>
+            <a:custGeom>
+              <a:avLst/>
+              <a:gdLst/>
+              <a:ahLst/>
+              <a:cxnLst>
+                <a:cxn ang="0">
+                  <a:pos x="wd2" y="hd2"/>
+                </a:cxn>
+                <a:cxn ang="5400000">
+                  <a:pos x="wd2" y="hd2"/>
+                </a:cxn>
+                <a:cxn ang="10800000">
+                  <a:pos x="wd2" y="hd2"/>
+                </a:cxn>
+                <a:cxn ang="16200000">
+                  <a:pos x="wd2" y="hd2"/>
+                </a:cxn>
+              </a:cxnLst>
+              <a:rect l="0" t="0" r="r" b="b"/>
+              <a:pathLst>
+                <a:path w="21600" h="0" fill="norm" stroke="1" extrusionOk="0">
+                  <a:moveTo>
+                    <a:pt x="0" y="0"/>
+                  </a:moveTo>
+                  <a:lnTo>
+                    <a:pt x="21600" y="0"/>
+                  </a:lnTo>
+                  <a:lnTo>
+                    <a:pt x="21600" y="0"/>
+                  </a:lnTo>
+                  <a:lnTo>
+                    <a:pt x="0" y="0"/>
+                  </a:lnTo>
+                  <a:close/>
+                </a:path>
+              </a:pathLst>
+            </a:custGeom>
+            <a:solidFill>
+              <a:srgbClr val="FF9B53"/>
+            </a:solidFill>
+            <a:ln w="12700" cap="flat">
+              <a:noFill/>
+              <a:miter lim="400000"/>
+            </a:ln>
+            <a:effectLst/>
+            <a:extLst>
+              <a:ext uri="{C572A759-6A51-4108-AA02-DFA0A04FC94B}">
+                <ma14:wrappingTextBoxFlag xmlns:ma14="http://schemas.microsoft.com/office/mac/drawingml/2011/main" val="1"/>
+              </a:ext>
+            </a:extLst>
+          </p:spPr>
+          <p:txBody>
+            <a:bodyPr wrap="square" lIns="91424" tIns="91424" rIns="91424" bIns="91424" numCol="1" anchor="ctr">
+              <a:spAutoFit/>
+            </a:bodyPr>
+            <a:lstStyle/>
+            <a:p>
+              <a:pPr>
+                <a:defRPr sz="1000"/>
+              </a:pPr>
+              <a:r>
+                <a:t>b. Scan AMI’s or containers for OS vulnerabilities</a:t>
+              </a:r>
+            </a:p>
+            <a:p>
+              <a:pPr>
+                <a:defRPr sz="1000"/>
+              </a:pPr>
+            </a:p>
+            <a:p>
+              <a:pPr>
+                <a:defRPr b="1" sz="1000"/>
+              </a:pPr>
+              <a:r>
+                <a:t>- Qualys Scanner </a:t>
+              </a:r>
+            </a:p>
+          </p:txBody>
+        </p:sp>
+      </p:grpSp>
+      <p:grpSp>
+        <p:nvGrpSpPr>
+          <p:cNvPr id="136" name="Google Shape;54;p13"/>
+          <p:cNvGrpSpPr/>
+          <p:nvPr/>
+        </p:nvGrpSpPr>
+        <p:grpSpPr>
+          <a:xfrm>
+            <a:off x="7639545" y="3728950"/>
+            <a:ext cx="1308001" cy="597601"/>
+            <a:chOff x="0" y="279497"/>
+            <a:chExt cx="1308000" cy="597600"/>
+          </a:xfrm>
+        </p:grpSpPr>
+        <p:sp>
+          <p:nvSpPr>
+            <p:cNvPr id="134" name="Rectangle"/>
+            <p:cNvSpPr/>
+            <p:nvPr/>
+          </p:nvSpPr>
+          <p:spPr>
+            <a:xfrm>
+              <a:off x="0" y="279497"/>
+              <a:ext cx="1308001" cy="597601"/>
+            </a:xfrm>
+            <a:prstGeom prst="rect">
+              <a:avLst/>
+            </a:prstGeom>
+            <a:solidFill>
+              <a:srgbClr val="CFE2F3"/>
+            </a:solidFill>
+            <a:ln w="12700" cap="flat">
+              <a:noFill/>
+              <a:miter lim="400000"/>
+            </a:ln>
+            <a:effectLst/>
+          </p:spPr>
+          <p:txBody>
+            <a:bodyPr wrap="square" lIns="0" tIns="0" rIns="0" bIns="0" numCol="1" anchor="ctr">
+              <a:noAutofit/>
+            </a:bodyPr>
+            <a:lstStyle/>
+            <a:p>
+              <a:pPr algn="ctr">
+                <a:defRPr sz="1000"/>
+              </a:pPr>
+            </a:p>
+          </p:txBody>
+        </p:sp>
+        <p:sp>
+          <p:nvSpPr>
+            <p:cNvPr id="135" name="c. Scan an AWS environment for cloud configuration vulnerabilities…"/>
+            <p:cNvSpPr/>
+            <p:nvPr/>
+          </p:nvSpPr>
+          <p:spPr>
+            <a:xfrm>
+              <a:off x="0" y="578297"/>
+              <a:ext cx="1308001" cy="1"/>
+            </a:xfrm>
+            <a:custGeom>
+              <a:avLst/>
+              <a:gdLst/>
+              <a:ahLst/>
+              <a:cxnLst>
+                <a:cxn ang="0">
+                  <a:pos x="wd2" y="hd2"/>
+                </a:cxn>
+                <a:cxn ang="5400000">
+                  <a:pos x="wd2" y="hd2"/>
+                </a:cxn>
+                <a:cxn ang="10800000">
+                  <a:pos x="wd2" y="hd2"/>
+                </a:cxn>
+                <a:cxn ang="16200000">
+                  <a:pos x="wd2" y="hd2"/>
+                </a:cxn>
+              </a:cxnLst>
+              <a:rect l="0" t="0" r="r" b="b"/>
+              <a:pathLst>
+                <a:path w="21600" h="0" fill="norm" stroke="1" extrusionOk="0">
+                  <a:moveTo>
+                    <a:pt x="0" y="0"/>
+                  </a:moveTo>
+                  <a:lnTo>
+                    <a:pt x="21600" y="0"/>
+                  </a:lnTo>
+                  <a:lnTo>
+                    <a:pt x="21600" y="0"/>
+                  </a:lnTo>
+                  <a:lnTo>
+                    <a:pt x="0" y="0"/>
+                  </a:lnTo>
+                  <a:close/>
+                </a:path>
+              </a:pathLst>
+            </a:custGeom>
+            <a:solidFill>
+              <a:srgbClr val="FF9B53"/>
+            </a:solidFill>
+            <a:ln w="12700" cap="flat">
+              <a:noFill/>
+              <a:miter lim="400000"/>
+            </a:ln>
+            <a:effectLst/>
+            <a:extLst>
+              <a:ext uri="{C572A759-6A51-4108-AA02-DFA0A04FC94B}">
+                <ma14:wrappingTextBoxFlag xmlns:ma14="http://schemas.microsoft.com/office/mac/drawingml/2011/main" val="1"/>
+              </a:ext>
+            </a:extLst>
+          </p:spPr>
+          <p:txBody>
+            <a:bodyPr wrap="square" lIns="91424" tIns="91424" rIns="91424" bIns="91424" numCol="1" anchor="ctr">
+              <a:spAutoFit/>
+            </a:bodyPr>
+            <a:lstStyle/>
+            <a:p>
+              <a:pPr>
+                <a:defRPr sz="1000"/>
+              </a:pPr>
               <a:r>
                 <a:t>c. Scan an AWS environment for cloud configuration vulnerabilities</a:t>
+              </a:r>
+            </a:p>
+            <a:p>
+              <a:pPr>
+                <a:defRPr sz="1000"/>
+              </a:pPr>
+            </a:p>
+            <a:p>
+              <a:pPr>
+                <a:defRPr b="1" sz="1000"/>
+              </a:pPr>
+              <a:r>
+                <a:t>- AWS Config</a:t>
+              </a:r>
+            </a:p>
+            <a:p>
+              <a:pPr>
+                <a:defRPr b="1" sz="1000"/>
+              </a:pPr>
+              <a:r>
+                <a:t>- AWS Inspect</a:t>
               </a:r>
             </a:p>
           </p:txBody>
@@ -3894,8 +4003,8 @@
         </p:nvSpPr>
         <p:spPr>
           <a:xfrm>
-            <a:off x="7385050" y="2708910"/>
-            <a:ext cx="908050" cy="1318261"/>
+            <a:off x="7205980" y="2409190"/>
+            <a:ext cx="1087121" cy="1040131"/>
           </a:xfrm>
           <a:custGeom>
             <a:avLst/>
@@ -3919,19 +4028,19 @@
             <a:pathLst>
               <a:path w="21600" h="21600" fill="norm" stroke="1" extrusionOk="0">
                 <a:moveTo>
-                  <a:pt x="21600" y="0"/>
+                  <a:pt x="5047" y="0"/>
                 </a:moveTo>
                 <a:lnTo>
-                  <a:pt x="21600" y="6160"/>
+                  <a:pt x="0" y="0"/>
                 </a:lnTo>
                 <a:lnTo>
-                  <a:pt x="0" y="6160"/>
+                  <a:pt x="0" y="14031"/>
                 </a:lnTo>
                 <a:lnTo>
-                  <a:pt x="0" y="21600"/>
+                  <a:pt x="21600" y="14031"/>
                 </a:lnTo>
                 <a:lnTo>
-                  <a:pt x="6042" y="21600"/>
+                  <a:pt x="21600" y="21600"/>
                 </a:lnTo>
               </a:path>
             </a:pathLst>

</xml_diff>